<commit_message>
FDI plot with confidence intervals
</commit_message>
<xml_diff>
--- a/fdi_plot.pptx
+++ b/fdi_plot.pptx
@@ -3192,8 +3192,8 @@
           </p:nvSpPr>
           <p:spPr>
             <a:xfrm>
-              <a:off x="4340693" y="1761070"/>
-              <a:ext cx="6791117" cy="6839678"/>
+              <a:off x="4375488" y="1761070"/>
+              <a:ext cx="6756322" cy="6833458"/>
             </a:xfrm>
             <a:prstGeom prst="rect">
               <a:avLst/>
@@ -3212,26 +3212,325 @@
         </p:sp>
         <p:sp>
           <p:nvSpPr>
-            <p:cNvPr id="6" name="pt6"/>
+            <p:cNvPr id="6" name="pl6"/>
             <p:cNvSpPr/>
             <p:nvPr/>
           </p:nvSpPr>
           <p:spPr>
             <a:xfrm>
-              <a:off x="4854810" y="2294215"/>
-              <a:ext cx="49651" cy="49651"/>
+              <a:off x="4682593" y="4797686"/>
+              <a:ext cx="6142111" cy="3191980"/>
             </a:xfrm>
-            <a:prstGeom prst="ellipse">
+            <a:custGeom>
               <a:avLst/>
-            </a:prstGeom>
-            <a:solidFill>
-              <a:srgbClr val="000000">
-                <a:alpha val="100000"/>
-              </a:srgbClr>
-            </a:solidFill>
-            <a:ln w="9000" cap="rnd">
+              <a:pathLst>
+                <a:path w="6142111" h="3191980">
+                  <a:moveTo>
+                    <a:pt x="0" y="0"/>
+                  </a:moveTo>
+                  <a:lnTo>
+                    <a:pt x="62041" y="80941"/>
+                  </a:lnTo>
+                  <a:lnTo>
+                    <a:pt x="124083" y="158274"/>
+                  </a:lnTo>
+                  <a:lnTo>
+                    <a:pt x="186124" y="235484"/>
+                  </a:lnTo>
+                  <a:lnTo>
+                    <a:pt x="248166" y="310003"/>
+                  </a:lnTo>
+                  <a:lnTo>
+                    <a:pt x="310207" y="383585"/>
+                  </a:lnTo>
+                  <a:lnTo>
+                    <a:pt x="372249" y="455513"/>
+                  </a:lnTo>
+                  <a:lnTo>
+                    <a:pt x="434290" y="524702"/>
+                  </a:lnTo>
+                  <a:lnTo>
+                    <a:pt x="496332" y="592935"/>
+                  </a:lnTo>
+                  <a:lnTo>
+                    <a:pt x="558373" y="659415"/>
+                  </a:lnTo>
+                  <a:lnTo>
+                    <a:pt x="620415" y="723537"/>
+                  </a:lnTo>
+                  <a:lnTo>
+                    <a:pt x="682456" y="787361"/>
+                  </a:lnTo>
+                  <a:lnTo>
+                    <a:pt x="744498" y="849344"/>
+                  </a:lnTo>
+                  <a:lnTo>
+                    <a:pt x="806539" y="910077"/>
+                  </a:lnTo>
+                  <a:lnTo>
+                    <a:pt x="868581" y="969069"/>
+                  </a:lnTo>
+                  <a:lnTo>
+                    <a:pt x="930622" y="1026806"/>
+                  </a:lnTo>
+                  <a:lnTo>
+                    <a:pt x="992664" y="1083663"/>
+                  </a:lnTo>
+                  <a:lnTo>
+                    <a:pt x="1054706" y="1138407"/>
+                  </a:lnTo>
+                  <a:lnTo>
+                    <a:pt x="1116747" y="1192677"/>
+                  </a:lnTo>
+                  <a:lnTo>
+                    <a:pt x="1178789" y="1244826"/>
+                  </a:lnTo>
+                  <a:lnTo>
+                    <a:pt x="1240830" y="1296647"/>
+                  </a:lnTo>
+                  <a:lnTo>
+                    <a:pt x="1302872" y="1346084"/>
+                  </a:lnTo>
+                  <a:lnTo>
+                    <a:pt x="1364913" y="1395633"/>
+                  </a:lnTo>
+                  <a:lnTo>
+                    <a:pt x="1426955" y="1443057"/>
+                  </a:lnTo>
+                  <a:lnTo>
+                    <a:pt x="1488996" y="1490544"/>
+                  </a:lnTo>
+                  <a:lnTo>
+                    <a:pt x="1551038" y="1536855"/>
+                  </a:lnTo>
+                  <a:lnTo>
+                    <a:pt x="1613079" y="1581036"/>
+                  </a:lnTo>
+                  <a:lnTo>
+                    <a:pt x="1675121" y="1625616"/>
+                  </a:lnTo>
+                  <a:lnTo>
+                    <a:pt x="1737162" y="1667369"/>
+                  </a:lnTo>
+                  <a:lnTo>
+                    <a:pt x="1799204" y="1709732"/>
+                  </a:lnTo>
+                  <a:lnTo>
+                    <a:pt x="1861245" y="1749978"/>
+                  </a:lnTo>
+                  <a:lnTo>
+                    <a:pt x="1923287" y="1790363"/>
+                  </a:lnTo>
+                  <a:lnTo>
+                    <a:pt x="1985328" y="1828911"/>
+                  </a:lnTo>
+                  <a:lnTo>
+                    <a:pt x="2047370" y="1867351"/>
+                  </a:lnTo>
+                  <a:lnTo>
+                    <a:pt x="2109412" y="1904884"/>
+                  </a:lnTo>
+                  <a:lnTo>
+                    <a:pt x="2171453" y="1941659"/>
+                  </a:lnTo>
+                  <a:lnTo>
+                    <a:pt x="2233495" y="1976838"/>
+                  </a:lnTo>
+                  <a:lnTo>
+                    <a:pt x="2295536" y="2012030"/>
+                  </a:lnTo>
+                  <a:lnTo>
+                    <a:pt x="2357578" y="2045683"/>
+                  </a:lnTo>
+                  <a:lnTo>
+                    <a:pt x="2419619" y="2078512"/>
+                  </a:lnTo>
+                  <a:lnTo>
+                    <a:pt x="2481661" y="2111300"/>
+                  </a:lnTo>
+                  <a:lnTo>
+                    <a:pt x="2543702" y="2143559"/>
+                  </a:lnTo>
+                  <a:lnTo>
+                    <a:pt x="2605744" y="2174754"/>
+                  </a:lnTo>
+                  <a:lnTo>
+                    <a:pt x="2667785" y="2205537"/>
+                  </a:lnTo>
+                  <a:lnTo>
+                    <a:pt x="2729827" y="2235719"/>
+                  </a:lnTo>
+                  <a:lnTo>
+                    <a:pt x="2791868" y="2264407"/>
+                  </a:lnTo>
+                  <a:lnTo>
+                    <a:pt x="2853910" y="2293530"/>
+                  </a:lnTo>
+                  <a:lnTo>
+                    <a:pt x="2915951" y="2321473"/>
+                  </a:lnTo>
+                  <a:lnTo>
+                    <a:pt x="2977993" y="2348563"/>
+                  </a:lnTo>
+                  <a:lnTo>
+                    <a:pt x="3040034" y="2375767"/>
+                  </a:lnTo>
+                  <a:lnTo>
+                    <a:pt x="3102076" y="2401584"/>
+                  </a:lnTo>
+                  <a:lnTo>
+                    <a:pt x="3164118" y="2427770"/>
+                  </a:lnTo>
+                  <a:lnTo>
+                    <a:pt x="3226159" y="2452944"/>
+                  </a:lnTo>
+                  <a:lnTo>
+                    <a:pt x="3288201" y="2476674"/>
+                  </a:lnTo>
+                  <a:lnTo>
+                    <a:pt x="3350242" y="2500761"/>
+                  </a:lnTo>
+                  <a:lnTo>
+                    <a:pt x="3412284" y="2524125"/>
+                  </a:lnTo>
+                  <a:lnTo>
+                    <a:pt x="3474325" y="2548120"/>
+                  </a:lnTo>
+                  <a:lnTo>
+                    <a:pt x="3536367" y="2569829"/>
+                  </a:lnTo>
+                  <a:lnTo>
+                    <a:pt x="3598408" y="2591784"/>
+                  </a:lnTo>
+                  <a:lnTo>
+                    <a:pt x="3660450" y="2613109"/>
+                  </a:lnTo>
+                  <a:lnTo>
+                    <a:pt x="3722491" y="2634664"/>
+                  </a:lnTo>
+                  <a:lnTo>
+                    <a:pt x="3784533" y="2655012"/>
+                  </a:lnTo>
+                  <a:lnTo>
+                    <a:pt x="3846574" y="2676099"/>
+                  </a:lnTo>
+                  <a:lnTo>
+                    <a:pt x="3908616" y="2695613"/>
+                  </a:lnTo>
+                  <a:lnTo>
+                    <a:pt x="3970657" y="2714619"/>
+                  </a:lnTo>
+                  <a:lnTo>
+                    <a:pt x="4032699" y="2733085"/>
+                  </a:lnTo>
+                  <a:lnTo>
+                    <a:pt x="4094740" y="2752158"/>
+                  </a:lnTo>
+                  <a:lnTo>
+                    <a:pt x="4156782" y="2770904"/>
+                  </a:lnTo>
+                  <a:lnTo>
+                    <a:pt x="4218824" y="2788798"/>
+                  </a:lnTo>
+                  <a:lnTo>
+                    <a:pt x="4280865" y="2806062"/>
+                  </a:lnTo>
+                  <a:lnTo>
+                    <a:pt x="4342907" y="2823930"/>
+                  </a:lnTo>
+                  <a:lnTo>
+                    <a:pt x="4404948" y="2839147"/>
+                  </a:lnTo>
+                  <a:lnTo>
+                    <a:pt x="4466990" y="2854817"/>
+                  </a:lnTo>
+                  <a:lnTo>
+                    <a:pt x="4529031" y="2871482"/>
+                  </a:lnTo>
+                  <a:lnTo>
+                    <a:pt x="4591073" y="2886922"/>
+                  </a:lnTo>
+                  <a:lnTo>
+                    <a:pt x="4653114" y="2903276"/>
+                  </a:lnTo>
+                  <a:lnTo>
+                    <a:pt x="4715156" y="2918301"/>
+                  </a:lnTo>
+                  <a:lnTo>
+                    <a:pt x="4777197" y="2932674"/>
+                  </a:lnTo>
+                  <a:lnTo>
+                    <a:pt x="4839239" y="2947332"/>
+                  </a:lnTo>
+                  <a:lnTo>
+                    <a:pt x="4901280" y="2961448"/>
+                  </a:lnTo>
+                  <a:lnTo>
+                    <a:pt x="4963322" y="2975992"/>
+                  </a:lnTo>
+                  <a:lnTo>
+                    <a:pt x="5025363" y="2988706"/>
+                  </a:lnTo>
+                  <a:lnTo>
+                    <a:pt x="5087405" y="3003348"/>
+                  </a:lnTo>
+                  <a:lnTo>
+                    <a:pt x="5149446" y="3015041"/>
+                  </a:lnTo>
+                  <a:lnTo>
+                    <a:pt x="5211488" y="3028768"/>
+                  </a:lnTo>
+                  <a:lnTo>
+                    <a:pt x="5273530" y="3040893"/>
+                  </a:lnTo>
+                  <a:lnTo>
+                    <a:pt x="5335571" y="3053570"/>
+                  </a:lnTo>
+                  <a:lnTo>
+                    <a:pt x="5397613" y="3064755"/>
+                  </a:lnTo>
+                  <a:lnTo>
+                    <a:pt x="5459654" y="3078357"/>
+                  </a:lnTo>
+                  <a:lnTo>
+                    <a:pt x="5521696" y="3088839"/>
+                  </a:lnTo>
+                  <a:lnTo>
+                    <a:pt x="5583737" y="3099934"/>
+                  </a:lnTo>
+                  <a:lnTo>
+                    <a:pt x="5645779" y="3110912"/>
+                  </a:lnTo>
+                  <a:lnTo>
+                    <a:pt x="5707820" y="3122142"/>
+                  </a:lnTo>
+                  <a:lnTo>
+                    <a:pt x="5769862" y="3132420"/>
+                  </a:lnTo>
+                  <a:lnTo>
+                    <a:pt x="5831903" y="3143720"/>
+                  </a:lnTo>
+                  <a:lnTo>
+                    <a:pt x="5893945" y="3152885"/>
+                  </a:lnTo>
+                  <a:lnTo>
+                    <a:pt x="5955986" y="3164061"/>
+                  </a:lnTo>
+                  <a:lnTo>
+                    <a:pt x="6018028" y="3173688"/>
+                  </a:lnTo>
+                  <a:lnTo>
+                    <a:pt x="6080069" y="3183730"/>
+                  </a:lnTo>
+                  <a:lnTo>
+                    <a:pt x="6142111" y="3191980"/>
+                  </a:lnTo>
+                </a:path>
+              </a:pathLst>
+            </a:custGeom>
+            <a:ln w="27101" cap="flat">
               <a:solidFill>
-                <a:srgbClr val="000000">
+                <a:srgbClr val="000099">
                   <a:alpha val="100000"/>
                 </a:srgbClr>
               </a:solidFill>
@@ -3253,7 +3552,7 @@
           </p:nvSpPr>
           <p:spPr>
             <a:xfrm>
-              <a:off x="5348461" y="6659030"/>
+              <a:off x="5151957" y="3665170"/>
               <a:ext cx="49651" cy="49651"/>
             </a:xfrm>
             <a:prstGeom prst="ellipse">
@@ -3288,7 +3587,7 @@
           </p:nvSpPr>
           <p:spPr>
             <a:xfrm>
-              <a:off x="4914876" y="5111827"/>
+              <a:off x="5620895" y="7023442"/>
               <a:ext cx="49651" cy="49651"/>
             </a:xfrm>
             <a:prstGeom prst="ellipse">
@@ -3323,7 +3622,7 @@
           </p:nvSpPr>
           <p:spPr>
             <a:xfrm>
-              <a:off x="5172749" y="4680224"/>
+              <a:off x="5209016" y="5833030"/>
               <a:ext cx="49651" cy="49651"/>
             </a:xfrm>
             <a:prstGeom prst="ellipse">
@@ -3358,7 +3657,7 @@
           </p:nvSpPr>
           <p:spPr>
             <a:xfrm>
-              <a:off x="5136156" y="2047139"/>
+              <a:off x="5453979" y="5500957"/>
               <a:ext cx="49651" cy="49651"/>
             </a:xfrm>
             <a:prstGeom prst="ellipse">
@@ -3393,7 +3692,7 @@
           </p:nvSpPr>
           <p:spPr>
             <a:xfrm>
-              <a:off x="4847215" y="3325681"/>
+              <a:off x="5419219" y="3475071"/>
               <a:ext cx="49651" cy="49651"/>
             </a:xfrm>
             <a:prstGeom prst="ellipse">
@@ -3428,7 +3727,7 @@
           </p:nvSpPr>
           <p:spPr>
             <a:xfrm>
-              <a:off x="4850322" y="4326497"/>
+              <a:off x="5144742" y="4458776"/>
               <a:ext cx="49651" cy="49651"/>
             </a:xfrm>
             <a:prstGeom prst="ellipse">
@@ -3463,7 +3762,7 @@
           </p:nvSpPr>
           <p:spPr>
             <a:xfrm>
-              <a:off x="4835478" y="4024065"/>
+              <a:off x="5147694" y="5228801"/>
               <a:ext cx="49651" cy="49651"/>
             </a:xfrm>
             <a:prstGeom prst="ellipse">
@@ -3498,7 +3797,7 @@
           </p:nvSpPr>
           <p:spPr>
             <a:xfrm>
-              <a:off x="4624555" y="6862008"/>
+              <a:off x="5133593" y="4996111"/>
               <a:ext cx="49651" cy="49651"/>
             </a:xfrm>
             <a:prstGeom prst="ellipse">
@@ -3533,7 +3832,7 @@
           </p:nvSpPr>
           <p:spPr>
             <a:xfrm>
-              <a:off x="4788184" y="4617675"/>
+              <a:off x="4933228" y="7179613"/>
               <a:ext cx="49651" cy="49651"/>
             </a:xfrm>
             <a:prstGeom prst="ellipse">
@@ -3568,7 +3867,7 @@
           </p:nvSpPr>
           <p:spPr>
             <a:xfrm>
-              <a:off x="5650520" y="6007561"/>
+              <a:off x="5088666" y="5452831"/>
               <a:ext cx="49651" cy="49651"/>
             </a:xfrm>
             <a:prstGeom prst="ellipse">
@@ -3603,7 +3902,7 @@
           </p:nvSpPr>
           <p:spPr>
             <a:xfrm>
-              <a:off x="6002634" y="7246695"/>
+              <a:off x="5907833" y="6522205"/>
               <a:ext cx="49651" cy="49651"/>
             </a:xfrm>
             <a:prstGeom prst="ellipse">
@@ -3638,7 +3937,7 @@
           </p:nvSpPr>
           <p:spPr>
             <a:xfrm>
-              <a:off x="7328588" y="7755549"/>
+              <a:off x="6242321" y="7475590"/>
               <a:ext cx="49651" cy="49651"/>
             </a:xfrm>
             <a:prstGeom prst="ellipse">
@@ -3673,7 +3972,7 @@
           </p:nvSpPr>
           <p:spPr>
             <a:xfrm>
-              <a:off x="7252641" y="6828855"/>
+              <a:off x="7501896" y="7867100"/>
               <a:ext cx="49651" cy="49651"/>
             </a:xfrm>
             <a:prstGeom prst="ellipse">
@@ -3708,7 +4007,7 @@
           </p:nvSpPr>
           <p:spPr>
             <a:xfrm>
-              <a:off x="7539511" y="7409331"/>
+              <a:off x="7429752" y="7154105"/>
               <a:ext cx="49651" cy="49651"/>
             </a:xfrm>
             <a:prstGeom prst="ellipse">
@@ -3743,7 +4042,7 @@
           </p:nvSpPr>
           <p:spPr>
             <a:xfrm>
-              <a:off x="8969027" y="7042781"/>
+              <a:off x="7702261" y="7600721"/>
               <a:ext cx="49651" cy="49651"/>
             </a:xfrm>
             <a:prstGeom prst="ellipse">
@@ -3778,7 +4077,7 @@
           </p:nvSpPr>
           <p:spPr>
             <a:xfrm>
-              <a:off x="9076043" y="6456987"/>
+              <a:off x="9060215" y="7318699"/>
               <a:ext cx="49651" cy="49651"/>
             </a:xfrm>
             <a:prstGeom prst="ellipse">
@@ -3813,7 +4112,7 @@
           </p:nvSpPr>
           <p:spPr>
             <a:xfrm>
-              <a:off x="10669189" y="7529740"/>
+              <a:off x="9161873" y="6867991"/>
               <a:ext cx="49651" cy="49651"/>
             </a:xfrm>
             <a:prstGeom prst="ellipse">
@@ -3848,7 +4147,7 @@
           </p:nvSpPr>
           <p:spPr>
             <a:xfrm>
-              <a:off x="10798297" y="7049975"/>
+              <a:off x="10675266" y="7693363"/>
               <a:ext cx="49651" cy="49651"/>
             </a:xfrm>
             <a:prstGeom prst="ellipse">
@@ -3883,7 +4182,7 @@
           </p:nvSpPr>
           <p:spPr>
             <a:xfrm>
-              <a:off x="10272542" y="8265028"/>
+              <a:off x="10797911" y="7324234"/>
               <a:ext cx="49651" cy="49651"/>
             </a:xfrm>
             <a:prstGeom prst="ellipse">
@@ -3912,85 +4211,26 @@
         </p:sp>
         <p:sp>
           <p:nvSpPr>
-            <p:cNvPr id="26" name="pl26"/>
+            <p:cNvPr id="26" name="pt26"/>
             <p:cNvSpPr/>
             <p:nvPr/>
           </p:nvSpPr>
           <p:spPr>
             <a:xfrm>
-              <a:off x="4649380" y="4191954"/>
-              <a:ext cx="6173742" cy="3849226"/>
+              <a:off x="10298475" y="8259091"/>
+              <a:ext cx="49651" cy="49651"/>
             </a:xfrm>
-            <a:custGeom>
+            <a:prstGeom prst="ellipse">
               <a:avLst/>
-              <a:pathLst>
-                <a:path w="6173742" h="3849226">
-                  <a:moveTo>
-                    <a:pt x="0" y="0"/>
-                  </a:moveTo>
-                  <a:lnTo>
-                    <a:pt x="163629" y="227571"/>
-                  </a:lnTo>
-                  <a:lnTo>
-                    <a:pt x="210923" y="291162"/>
-                  </a:lnTo>
-                  <a:lnTo>
-                    <a:pt x="222660" y="306796"/>
-                  </a:lnTo>
-                  <a:lnTo>
-                    <a:pt x="225767" y="310924"/>
-                  </a:lnTo>
-                  <a:lnTo>
-                    <a:pt x="230255" y="316880"/>
-                  </a:lnTo>
-                  <a:lnTo>
-                    <a:pt x="290321" y="395787"/>
-                  </a:lnTo>
-                  <a:lnTo>
-                    <a:pt x="511601" y="673762"/>
-                  </a:lnTo>
-                  <a:lnTo>
-                    <a:pt x="548194" y="717868"/>
-                  </a:lnTo>
-                  <a:lnTo>
-                    <a:pt x="723906" y="922631"/>
-                  </a:lnTo>
-                  <a:lnTo>
-                    <a:pt x="1025965" y="1248876"/>
-                  </a:lnTo>
-                  <a:lnTo>
-                    <a:pt x="1378079" y="1591538"/>
-                  </a:lnTo>
-                  <a:lnTo>
-                    <a:pt x="2628086" y="2539345"/>
-                  </a:lnTo>
-                  <a:lnTo>
-                    <a:pt x="2704033" y="2585643"/>
-                  </a:lnTo>
-                  <a:lnTo>
-                    <a:pt x="2914956" y="2708494"/>
-                  </a:lnTo>
-                  <a:lnTo>
-                    <a:pt x="4344472" y="3354804"/>
-                  </a:lnTo>
-                  <a:lnTo>
-                    <a:pt x="4451488" y="3392343"/>
-                  </a:lnTo>
-                  <a:lnTo>
-                    <a:pt x="5647987" y="3735296"/>
-                  </a:lnTo>
-                  <a:lnTo>
-                    <a:pt x="6044634" y="3822993"/>
-                  </a:lnTo>
-                  <a:lnTo>
-                    <a:pt x="6173742" y="3849226"/>
-                  </a:lnTo>
-                </a:path>
-              </a:pathLst>
-            </a:custGeom>
-            <a:ln w="27101" cap="flat">
+            </a:prstGeom>
+            <a:solidFill>
+              <a:srgbClr val="000000">
+                <a:alpha val="100000"/>
+              </a:srgbClr>
+            </a:solidFill>
+            <a:ln w="9000" cap="rnd">
               <a:solidFill>
-                <a:srgbClr val="000099">
+                <a:srgbClr val="000000">
                   <a:alpha val="100000"/>
                 </a:srgbClr>
               </a:solidFill>
@@ -4006,14 +4246,645 @@
         </p:sp>
         <p:sp>
           <p:nvSpPr>
-            <p:cNvPr id="27" name="rc27"/>
+            <p:cNvPr id="27" name="pg27"/>
             <p:cNvSpPr/>
             <p:nvPr/>
           </p:nvSpPr>
           <p:spPr>
             <a:xfrm>
-              <a:off x="4340693" y="1761070"/>
-              <a:ext cx="6791117" cy="6839678"/>
+              <a:off x="4682593" y="2071682"/>
+              <a:ext cx="6142111" cy="6198043"/>
+            </a:xfrm>
+            <a:custGeom>
+              <a:avLst/>
+              <a:pathLst>
+                <a:path w="6142111" h="6198043">
+                  <a:moveTo>
+                    <a:pt x="0" y="0"/>
+                  </a:moveTo>
+                  <a:lnTo>
+                    <a:pt x="62041" y="105589"/>
+                  </a:lnTo>
+                  <a:lnTo>
+                    <a:pt x="124083" y="215747"/>
+                  </a:lnTo>
+                  <a:lnTo>
+                    <a:pt x="186124" y="321888"/>
+                  </a:lnTo>
+                  <a:lnTo>
+                    <a:pt x="248166" y="428467"/>
+                  </a:lnTo>
+                  <a:lnTo>
+                    <a:pt x="310207" y="534805"/>
+                  </a:lnTo>
+                  <a:lnTo>
+                    <a:pt x="372249" y="637450"/>
+                  </a:lnTo>
+                  <a:lnTo>
+                    <a:pt x="434290" y="738446"/>
+                  </a:lnTo>
+                  <a:lnTo>
+                    <a:pt x="496332" y="843615"/>
+                  </a:lnTo>
+                  <a:lnTo>
+                    <a:pt x="558373" y="943712"/>
+                  </a:lnTo>
+                  <a:lnTo>
+                    <a:pt x="620415" y="1042605"/>
+                  </a:lnTo>
+                  <a:lnTo>
+                    <a:pt x="682456" y="1146575"/>
+                  </a:lnTo>
+                  <a:lnTo>
+                    <a:pt x="744498" y="1247300"/>
+                  </a:lnTo>
+                  <a:lnTo>
+                    <a:pt x="806539" y="1348854"/>
+                  </a:lnTo>
+                  <a:lnTo>
+                    <a:pt x="868581" y="1448604"/>
+                  </a:lnTo>
+                  <a:lnTo>
+                    <a:pt x="930622" y="1551083"/>
+                  </a:lnTo>
+                  <a:lnTo>
+                    <a:pt x="992664" y="1654630"/>
+                  </a:lnTo>
+                  <a:lnTo>
+                    <a:pt x="1054706" y="1755774"/>
+                  </a:lnTo>
+                  <a:lnTo>
+                    <a:pt x="1116747" y="1858267"/>
+                  </a:lnTo>
+                  <a:lnTo>
+                    <a:pt x="1178789" y="1959372"/>
+                  </a:lnTo>
+                  <a:lnTo>
+                    <a:pt x="1240830" y="2061791"/>
+                  </a:lnTo>
+                  <a:lnTo>
+                    <a:pt x="1302872" y="2162062"/>
+                  </a:lnTo>
+                  <a:lnTo>
+                    <a:pt x="1364913" y="2262640"/>
+                  </a:lnTo>
+                  <a:lnTo>
+                    <a:pt x="1426955" y="2362453"/>
+                  </a:lnTo>
+                  <a:lnTo>
+                    <a:pt x="1488996" y="2460385"/>
+                  </a:lnTo>
+                  <a:lnTo>
+                    <a:pt x="1551038" y="2557618"/>
+                  </a:lnTo>
+                  <a:lnTo>
+                    <a:pt x="1613079" y="2652021"/>
+                  </a:lnTo>
+                  <a:lnTo>
+                    <a:pt x="1675121" y="2747362"/>
+                  </a:lnTo>
+                  <a:lnTo>
+                    <a:pt x="1737162" y="2838707"/>
+                  </a:lnTo>
+                  <a:lnTo>
+                    <a:pt x="1799204" y="2927862"/>
+                  </a:lnTo>
+                  <a:lnTo>
+                    <a:pt x="1861245" y="3014953"/>
+                  </a:lnTo>
+                  <a:lnTo>
+                    <a:pt x="1923287" y="3103020"/>
+                  </a:lnTo>
+                  <a:lnTo>
+                    <a:pt x="1985328" y="3186143"/>
+                  </a:lnTo>
+                  <a:lnTo>
+                    <a:pt x="2047370" y="3269088"/>
+                  </a:lnTo>
+                  <a:lnTo>
+                    <a:pt x="2109412" y="3348990"/>
+                  </a:lnTo>
+                  <a:lnTo>
+                    <a:pt x="2171453" y="3428692"/>
+                  </a:lnTo>
+                  <a:lnTo>
+                    <a:pt x="2233495" y="3504175"/>
+                  </a:lnTo>
+                  <a:lnTo>
+                    <a:pt x="2295536" y="3578438"/>
+                  </a:lnTo>
+                  <a:lnTo>
+                    <a:pt x="2357578" y="3650727"/>
+                  </a:lnTo>
+                  <a:lnTo>
+                    <a:pt x="2419619" y="3721578"/>
+                  </a:lnTo>
+                  <a:lnTo>
+                    <a:pt x="2481661" y="3790530"/>
+                  </a:lnTo>
+                  <a:lnTo>
+                    <a:pt x="2543702" y="3856387"/>
+                  </a:lnTo>
+                  <a:lnTo>
+                    <a:pt x="2605744" y="3923409"/>
+                  </a:lnTo>
+                  <a:lnTo>
+                    <a:pt x="2667785" y="3986612"/>
+                  </a:lnTo>
+                  <a:lnTo>
+                    <a:pt x="2729827" y="4049196"/>
+                  </a:lnTo>
+                  <a:lnTo>
+                    <a:pt x="2791868" y="4108812"/>
+                  </a:lnTo>
+                  <a:lnTo>
+                    <a:pt x="2853910" y="4166677"/>
+                  </a:lnTo>
+                  <a:lnTo>
+                    <a:pt x="2915951" y="4224148"/>
+                  </a:lnTo>
+                  <a:lnTo>
+                    <a:pt x="2977993" y="4279512"/>
+                  </a:lnTo>
+                  <a:lnTo>
+                    <a:pt x="3040034" y="4334136"/>
+                  </a:lnTo>
+                  <a:lnTo>
+                    <a:pt x="3102076" y="4385291"/>
+                  </a:lnTo>
+                  <a:lnTo>
+                    <a:pt x="3164118" y="4437802"/>
+                  </a:lnTo>
+                  <a:lnTo>
+                    <a:pt x="3226159" y="4486984"/>
+                  </a:lnTo>
+                  <a:lnTo>
+                    <a:pt x="3288201" y="4533369"/>
+                  </a:lnTo>
+                  <a:lnTo>
+                    <a:pt x="3350242" y="4580604"/>
+                  </a:lnTo>
+                  <a:lnTo>
+                    <a:pt x="3412284" y="4625486"/>
+                  </a:lnTo>
+                  <a:lnTo>
+                    <a:pt x="3474325" y="4672377"/>
+                  </a:lnTo>
+                  <a:lnTo>
+                    <a:pt x="3536367" y="4713328"/>
+                  </a:lnTo>
+                  <a:lnTo>
+                    <a:pt x="3598408" y="4756048"/>
+                  </a:lnTo>
+                  <a:lnTo>
+                    <a:pt x="3660450" y="4797030"/>
+                  </a:lnTo>
+                  <a:lnTo>
+                    <a:pt x="3722491" y="4836565"/>
+                  </a:lnTo>
+                  <a:lnTo>
+                    <a:pt x="3784533" y="4876231"/>
+                  </a:lnTo>
+                  <a:lnTo>
+                    <a:pt x="3846574" y="4914372"/>
+                  </a:lnTo>
+                  <a:lnTo>
+                    <a:pt x="3908616" y="4949077"/>
+                  </a:lnTo>
+                  <a:lnTo>
+                    <a:pt x="3970657" y="4985410"/>
+                  </a:lnTo>
+                  <a:lnTo>
+                    <a:pt x="4032699" y="5019333"/>
+                  </a:lnTo>
+                  <a:lnTo>
+                    <a:pt x="4094740" y="5054355"/>
+                  </a:lnTo>
+                  <a:lnTo>
+                    <a:pt x="4156782" y="5088192"/>
+                  </a:lnTo>
+                  <a:lnTo>
+                    <a:pt x="4218824" y="5119197"/>
+                  </a:lnTo>
+                  <a:lnTo>
+                    <a:pt x="4280865" y="5149829"/>
+                  </a:lnTo>
+                  <a:lnTo>
+                    <a:pt x="4342907" y="5181993"/>
+                  </a:lnTo>
+                  <a:lnTo>
+                    <a:pt x="4404948" y="5208878"/>
+                  </a:lnTo>
+                  <a:lnTo>
+                    <a:pt x="4466990" y="5236697"/>
+                  </a:lnTo>
+                  <a:lnTo>
+                    <a:pt x="4529031" y="5265832"/>
+                  </a:lnTo>
+                  <a:lnTo>
+                    <a:pt x="4591073" y="5292473"/>
+                  </a:lnTo>
+                  <a:lnTo>
+                    <a:pt x="4653114" y="5319795"/>
+                  </a:lnTo>
+                  <a:lnTo>
+                    <a:pt x="4715156" y="5346524"/>
+                  </a:lnTo>
+                  <a:lnTo>
+                    <a:pt x="4777197" y="5370120"/>
+                  </a:lnTo>
+                  <a:lnTo>
+                    <a:pt x="4839239" y="5394498"/>
+                  </a:lnTo>
+                  <a:lnTo>
+                    <a:pt x="4901280" y="5418565"/>
+                  </a:lnTo>
+                  <a:lnTo>
+                    <a:pt x="4963322" y="5442939"/>
+                  </a:lnTo>
+                  <a:lnTo>
+                    <a:pt x="5025363" y="5464725"/>
+                  </a:lnTo>
+                  <a:lnTo>
+                    <a:pt x="5087405" y="5487868"/>
+                  </a:lnTo>
+                  <a:lnTo>
+                    <a:pt x="5149446" y="5507732"/>
+                  </a:lnTo>
+                  <a:lnTo>
+                    <a:pt x="5211488" y="5530002"/>
+                  </a:lnTo>
+                  <a:lnTo>
+                    <a:pt x="5273530" y="5549021"/>
+                  </a:lnTo>
+                  <a:lnTo>
+                    <a:pt x="5335571" y="5569818"/>
+                  </a:lnTo>
+                  <a:lnTo>
+                    <a:pt x="5397613" y="5587805"/>
+                  </a:lnTo>
+                  <a:lnTo>
+                    <a:pt x="5459654" y="5609424"/>
+                  </a:lnTo>
+                  <a:lnTo>
+                    <a:pt x="5521696" y="5626304"/>
+                  </a:lnTo>
+                  <a:lnTo>
+                    <a:pt x="5583737" y="5643514"/>
+                  </a:lnTo>
+                  <a:lnTo>
+                    <a:pt x="5645779" y="5661046"/>
+                  </a:lnTo>
+                  <a:lnTo>
+                    <a:pt x="5707820" y="5677959"/>
+                  </a:lnTo>
+                  <a:lnTo>
+                    <a:pt x="5769862" y="5694542"/>
+                  </a:lnTo>
+                  <a:lnTo>
+                    <a:pt x="5831903" y="5711471"/>
+                  </a:lnTo>
+                  <a:lnTo>
+                    <a:pt x="5893945" y="5726531"/>
+                  </a:lnTo>
+                  <a:lnTo>
+                    <a:pt x="5955986" y="5742635"/>
+                  </a:lnTo>
+                  <a:lnTo>
+                    <a:pt x="6018028" y="5756913"/>
+                  </a:lnTo>
+                  <a:lnTo>
+                    <a:pt x="6080069" y="5772285"/>
+                  </a:lnTo>
+                  <a:lnTo>
+                    <a:pt x="6142111" y="5785282"/>
+                  </a:lnTo>
+                  <a:lnTo>
+                    <a:pt x="6142111" y="6198043"/>
+                  </a:lnTo>
+                  <a:lnTo>
+                    <a:pt x="6080069" y="6191951"/>
+                  </a:lnTo>
+                  <a:lnTo>
+                    <a:pt x="6018028" y="6185098"/>
+                  </a:lnTo>
+                  <a:lnTo>
+                    <a:pt x="5955986" y="6178868"/>
+                  </a:lnTo>
+                  <a:lnTo>
+                    <a:pt x="5893945" y="6170534"/>
+                  </a:lnTo>
+                  <a:lnTo>
+                    <a:pt x="5831903" y="6164279"/>
+                  </a:lnTo>
+                  <a:lnTo>
+                    <a:pt x="5769862" y="6155815"/>
+                  </a:lnTo>
+                  <a:lnTo>
+                    <a:pt x="5707820" y="6147887"/>
+                  </a:lnTo>
+                  <a:lnTo>
+                    <a:pt x="5645779" y="6139704"/>
+                  </a:lnTo>
+                  <a:lnTo>
+                    <a:pt x="5583737" y="6132114"/>
+                  </a:lnTo>
+                  <a:lnTo>
+                    <a:pt x="5521696" y="6122795"/>
+                  </a:lnTo>
+                  <a:lnTo>
+                    <a:pt x="5459654" y="6114207"/>
+                  </a:lnTo>
+                  <a:lnTo>
+                    <a:pt x="5397613" y="6104645"/>
+                  </a:lnTo>
+                  <a:lnTo>
+                    <a:pt x="5335571" y="6096089"/>
+                  </a:lnTo>
+                  <a:lnTo>
+                    <a:pt x="5273530" y="6085767"/>
+                  </a:lnTo>
+                  <a:lnTo>
+                    <a:pt x="5211488" y="6075692"/>
+                  </a:lnTo>
+                  <a:lnTo>
+                    <a:pt x="5149446" y="6065921"/>
+                  </a:lnTo>
+                  <a:lnTo>
+                    <a:pt x="5087405" y="6055098"/>
+                  </a:lnTo>
+                  <a:lnTo>
+                    <a:pt x="5025363" y="6044486"/>
+                  </a:lnTo>
+                  <a:lnTo>
+                    <a:pt x="4963322" y="6033883"/>
+                  </a:lnTo>
+                  <a:lnTo>
+                    <a:pt x="4901280" y="6021811"/>
+                  </a:lnTo>
+                  <a:lnTo>
+                    <a:pt x="4839239" y="6009496"/>
+                  </a:lnTo>
+                  <a:lnTo>
+                    <a:pt x="4777197" y="5996929"/>
+                  </a:lnTo>
+                  <a:lnTo>
+                    <a:pt x="4715156" y="5985627"/>
+                  </a:lnTo>
+                  <a:lnTo>
+                    <a:pt x="4653114" y="5971553"/>
+                  </a:lnTo>
+                  <a:lnTo>
+                    <a:pt x="4591073" y="5957698"/>
+                  </a:lnTo>
+                  <a:lnTo>
+                    <a:pt x="4529031" y="5945125"/>
+                  </a:lnTo>
+                  <a:lnTo>
+                    <a:pt x="4466990" y="5930023"/>
+                  </a:lnTo>
+                  <a:lnTo>
+                    <a:pt x="4404948" y="5915659"/>
+                  </a:lnTo>
+                  <a:lnTo>
+                    <a:pt x="4342907" y="5902093"/>
+                  </a:lnTo>
+                  <a:lnTo>
+                    <a:pt x="4280865" y="5885410"/>
+                  </a:lnTo>
+                  <a:lnTo>
+                    <a:pt x="4218824" y="5869640"/>
+                  </a:lnTo>
+                  <a:lnTo>
+                    <a:pt x="4156782" y="5853764"/>
+                  </a:lnTo>
+                  <a:lnTo>
+                    <a:pt x="4094740" y="5836423"/>
+                  </a:lnTo>
+                  <a:lnTo>
+                    <a:pt x="4032699" y="5817975"/>
+                  </a:lnTo>
+                  <a:lnTo>
+                    <a:pt x="3970657" y="5801478"/>
+                  </a:lnTo>
+                  <a:lnTo>
+                    <a:pt x="3908616" y="5782809"/>
+                  </a:lnTo>
+                  <a:lnTo>
+                    <a:pt x="3846574" y="5764399"/>
+                  </a:lnTo>
+                  <a:lnTo>
+                    <a:pt x="3784533" y="5743272"/>
+                  </a:lnTo>
+                  <a:lnTo>
+                    <a:pt x="3722491" y="5723822"/>
+                  </a:lnTo>
+                  <a:lnTo>
+                    <a:pt x="3660450" y="5703416"/>
+                  </a:lnTo>
+                  <a:lnTo>
+                    <a:pt x="3598408" y="5681920"/>
+                  </a:lnTo>
+                  <a:lnTo>
+                    <a:pt x="3536367" y="5659950"/>
+                  </a:lnTo>
+                  <a:lnTo>
+                    <a:pt x="3474325" y="5637899"/>
+                  </a:lnTo>
+                  <a:lnTo>
+                    <a:pt x="3412284" y="5614407"/>
+                  </a:lnTo>
+                  <a:lnTo>
+                    <a:pt x="3350242" y="5590611"/>
+                  </a:lnTo>
+                  <a:lnTo>
+                    <a:pt x="3288201" y="5566468"/>
+                  </a:lnTo>
+                  <a:lnTo>
+                    <a:pt x="3226159" y="5540875"/>
+                  </a:lnTo>
+                  <a:lnTo>
+                    <a:pt x="3164118" y="5515981"/>
+                  </a:lnTo>
+                  <a:lnTo>
+                    <a:pt x="3102076" y="5488650"/>
+                  </a:lnTo>
+                  <a:lnTo>
+                    <a:pt x="3040034" y="5462282"/>
+                  </a:lnTo>
+                  <a:lnTo>
+                    <a:pt x="2977993" y="5432901"/>
+                  </a:lnTo>
+                  <a:lnTo>
+                    <a:pt x="2915951" y="5405543"/>
+                  </a:lnTo>
+                  <a:lnTo>
+                    <a:pt x="2853910" y="5374366"/>
+                  </a:lnTo>
+                  <a:lnTo>
+                    <a:pt x="2791868" y="5343869"/>
+                  </a:lnTo>
+                  <a:lnTo>
+                    <a:pt x="2729827" y="5313262"/>
+                  </a:lnTo>
+                  <a:lnTo>
+                    <a:pt x="2667785" y="5280519"/>
+                  </a:lnTo>
+                  <a:lnTo>
+                    <a:pt x="2605744" y="5247093"/>
+                  </a:lnTo>
+                  <a:lnTo>
+                    <a:pt x="2543702" y="5213616"/>
+                  </a:lnTo>
+                  <a:lnTo>
+                    <a:pt x="2481661" y="5178417"/>
+                  </a:lnTo>
+                  <a:lnTo>
+                    <a:pt x="2419619" y="5142231"/>
+                  </a:lnTo>
+                  <a:lnTo>
+                    <a:pt x="2357578" y="5107153"/>
+                  </a:lnTo>
+                  <a:lnTo>
+                    <a:pt x="2295536" y="5069267"/>
+                  </a:lnTo>
+                  <a:lnTo>
+                    <a:pt x="2233495" y="5030015"/>
+                  </a:lnTo>
+                  <a:lnTo>
+                    <a:pt x="2171453" y="4990927"/>
+                  </a:lnTo>
+                  <a:lnTo>
+                    <a:pt x="2109412" y="4949697"/>
+                  </a:lnTo>
+                  <a:lnTo>
+                    <a:pt x="2047370" y="4908307"/>
+                  </a:lnTo>
+                  <a:lnTo>
+                    <a:pt x="1985328" y="4866263"/>
+                  </a:lnTo>
+                  <a:lnTo>
+                    <a:pt x="1923287" y="4823250"/>
+                  </a:lnTo>
+                  <a:lnTo>
+                    <a:pt x="1861245" y="4778346"/>
+                  </a:lnTo>
+                  <a:lnTo>
+                    <a:pt x="1799204" y="4733279"/>
+                  </a:lnTo>
+                  <a:lnTo>
+                    <a:pt x="1737162" y="4687059"/>
+                  </a:lnTo>
+                  <a:lnTo>
+                    <a:pt x="1675121" y="4640348"/>
+                  </a:lnTo>
+                  <a:lnTo>
+                    <a:pt x="1613079" y="4591861"/>
+                  </a:lnTo>
+                  <a:lnTo>
+                    <a:pt x="1551038" y="4542371"/>
+                  </a:lnTo>
+                  <a:lnTo>
+                    <a:pt x="1488996" y="4492899"/>
+                  </a:lnTo>
+                  <a:lnTo>
+                    <a:pt x="1426955" y="4441842"/>
+                  </a:lnTo>
+                  <a:lnTo>
+                    <a:pt x="1364913" y="4390799"/>
+                  </a:lnTo>
+                  <a:lnTo>
+                    <a:pt x="1302872" y="4337657"/>
+                  </a:lnTo>
+                  <a:lnTo>
+                    <a:pt x="1240830" y="4285749"/>
+                  </a:lnTo>
+                  <a:lnTo>
+                    <a:pt x="1178789" y="4232992"/>
+                  </a:lnTo>
+                  <a:lnTo>
+                    <a:pt x="1116747" y="4179289"/>
+                  </a:lnTo>
+                  <a:lnTo>
+                    <a:pt x="1054706" y="4125133"/>
+                  </a:lnTo>
+                  <a:lnTo>
+                    <a:pt x="992664" y="4071924"/>
+                  </a:lnTo>
+                  <a:lnTo>
+                    <a:pt x="930622" y="4016702"/>
+                  </a:lnTo>
+                  <a:lnTo>
+                    <a:pt x="868581" y="3963155"/>
+                  </a:lnTo>
+                  <a:lnTo>
+                    <a:pt x="806539" y="3909297"/>
+                  </a:lnTo>
+                  <a:lnTo>
+                    <a:pt x="744498" y="3856144"/>
+                  </a:lnTo>
+                  <a:lnTo>
+                    <a:pt x="682456" y="3802709"/>
+                  </a:lnTo>
+                  <a:lnTo>
+                    <a:pt x="620415" y="3749784"/>
+                  </a:lnTo>
+                  <a:lnTo>
+                    <a:pt x="558373" y="3697653"/>
+                  </a:lnTo>
+                  <a:lnTo>
+                    <a:pt x="496332" y="3646344"/>
+                  </a:lnTo>
+                  <a:lnTo>
+                    <a:pt x="434290" y="3594378"/>
+                  </a:lnTo>
+                  <a:lnTo>
+                    <a:pt x="372249" y="3543982"/>
+                  </a:lnTo>
+                  <a:lnTo>
+                    <a:pt x="310207" y="3491800"/>
+                  </a:lnTo>
+                  <a:lnTo>
+                    <a:pt x="248166" y="3439551"/>
+                  </a:lnTo>
+                  <a:lnTo>
+                    <a:pt x="186124" y="3389041"/>
+                  </a:lnTo>
+                  <a:lnTo>
+                    <a:pt x="124083" y="3337023"/>
+                  </a:lnTo>
+                  <a:lnTo>
+                    <a:pt x="62041" y="3286694"/>
+                  </a:lnTo>
+                  <a:lnTo>
+                    <a:pt x="0" y="3234880"/>
+                  </a:lnTo>
+                  <a:close/>
+                </a:path>
+              </a:pathLst>
+            </a:custGeom>
+            <a:solidFill>
+              <a:srgbClr val="333333">
+                <a:alpha val="54901"/>
+              </a:srgbClr>
+            </a:solidFill>
+          </p:spPr>
+          <p:txBody>
+            <a:bodyPr/>
+            <a:lstStyle/>
+            <a:p/>
+          </p:txBody>
+        </p:sp>
+        <p:sp>
+          <p:nvSpPr>
+            <p:cNvPr id="28" name="rc28"/>
+            <p:cNvSpPr/>
+            <p:nvPr/>
+          </p:nvSpPr>
+          <p:spPr>
+            <a:xfrm>
+              <a:off x="4375488" y="1761070"/>
+              <a:ext cx="6756322" cy="6833458"/>
             </a:xfrm>
             <a:prstGeom prst="rect">
               <a:avLst/>
@@ -4036,13 +4907,59 @@
         </p:sp>
         <p:sp>
           <p:nvSpPr>
-            <p:cNvPr id="28" name="tx28"/>
+            <p:cNvPr id="29" name="tx29"/>
             <p:cNvSpPr/>
             <p:nvPr/>
           </p:nvSpPr>
           <p:spPr>
             <a:xfrm>
-              <a:off x="4119171" y="6815649"/>
+              <a:off x="4153965" y="8529772"/>
+              <a:ext cx="158892" cy="83542"/>
+            </a:xfrm>
+            <a:prstGeom prst="rect">
+              <a:avLst/>
+            </a:prstGeom>
+            <a:noFill/>
+          </p:spPr>
+          <p:txBody>
+            <a:bodyPr lIns="0" rIns="0" tIns="0" bIns="0" anchorCtr="1" anchor="ctr" wrap="none"/>
+            <a:lstStyle/>
+            <a:p>
+              <a:pPr algn="l" marL="0" marR="0" indent="0">
+                <a:lnSpc>
+                  <a:spcPts val="880"/>
+                </a:lnSpc>
+                <a:spcBef>
+                  <a:spcPts val="0"/>
+                </a:spcBef>
+                <a:spcAft>
+                  <a:spcPts val="0"/>
+                </a:spcAft>
+              </a:pPr>
+              <a:r>
+                <a:rPr sz="880">
+                  <a:solidFill>
+                    <a:srgbClr val="4D4D4D">
+                      <a:alpha val="100000"/>
+                    </a:srgbClr>
+                  </a:solidFill>
+                  <a:latin typeface="Arial"/>
+                  <a:cs typeface="Arial"/>
+                </a:rPr>
+                <a:t>0.0</a:t>
+              </a:r>
+            </a:p>
+          </p:txBody>
+        </p:sp>
+        <p:sp>
+          <p:nvSpPr>
+            <p:cNvPr id="30" name="tx30"/>
+            <p:cNvSpPr/>
+            <p:nvPr/>
+          </p:nvSpPr>
+          <p:spPr>
+            <a:xfrm>
+              <a:off x="4153965" y="7139831"/>
               <a:ext cx="158892" cy="83542"/>
             </a:xfrm>
             <a:prstGeom prst="rect">
@@ -4082,13 +4999,13 @@
         </p:sp>
         <p:sp>
           <p:nvSpPr>
-            <p:cNvPr id="29" name="tx29"/>
+            <p:cNvPr id="31" name="tx31"/>
             <p:cNvSpPr/>
             <p:nvPr/>
           </p:nvSpPr>
           <p:spPr>
             <a:xfrm>
-              <a:off x="4119171" y="5009114"/>
+              <a:off x="4153965" y="5749890"/>
               <a:ext cx="158892" cy="83542"/>
             </a:xfrm>
             <a:prstGeom prst="rect">
@@ -4128,13 +5045,13 @@
         </p:sp>
         <p:sp>
           <p:nvSpPr>
-            <p:cNvPr id="30" name="tx30"/>
+            <p:cNvPr id="32" name="tx32"/>
             <p:cNvSpPr/>
             <p:nvPr/>
           </p:nvSpPr>
           <p:spPr>
             <a:xfrm>
-              <a:off x="4119171" y="3202580"/>
+              <a:off x="4153965" y="4359949"/>
               <a:ext cx="158892" cy="83542"/>
             </a:xfrm>
             <a:prstGeom prst="rect">
@@ -4174,122 +5091,48 @@
         </p:sp>
         <p:sp>
           <p:nvSpPr>
-            <p:cNvPr id="31" name="pl31"/>
+            <p:cNvPr id="33" name="tx33"/>
             <p:cNvSpPr/>
             <p:nvPr/>
           </p:nvSpPr>
           <p:spPr>
             <a:xfrm>
-              <a:off x="4305899" y="6858313"/>
-              <a:ext cx="34794" cy="0"/>
+              <a:off x="4153965" y="2970008"/>
+              <a:ext cx="158892" cy="83542"/>
             </a:xfrm>
-            <a:custGeom>
+            <a:prstGeom prst="rect">
               <a:avLst/>
-              <a:pathLst>
-                <a:path w="34794" h="0">
-                  <a:moveTo>
-                    <a:pt x="0" y="0"/>
-                  </a:moveTo>
-                  <a:lnTo>
-                    <a:pt x="34794" y="0"/>
-                  </a:lnTo>
-                </a:path>
-              </a:pathLst>
-            </a:custGeom>
-            <a:ln w="13550" cap="flat">
-              <a:solidFill>
-                <a:srgbClr val="333333">
-                  <a:alpha val="100000"/>
-                </a:srgbClr>
-              </a:solidFill>
-              <a:prstDash val="solid"/>
-              <a:round/>
-            </a:ln>
+            </a:prstGeom>
+            <a:noFill/>
           </p:spPr>
           <p:txBody>
-            <a:bodyPr/>
+            <a:bodyPr lIns="0" rIns="0" tIns="0" bIns="0" anchorCtr="1" anchor="ctr" wrap="none"/>
             <a:lstStyle/>
-            <a:p/>
-          </p:txBody>
-        </p:sp>
-        <p:sp>
-          <p:nvSpPr>
-            <p:cNvPr id="32" name="pl32"/>
-            <p:cNvSpPr/>
-            <p:nvPr/>
-          </p:nvSpPr>
-          <p:spPr>
-            <a:xfrm>
-              <a:off x="4305899" y="5051778"/>
-              <a:ext cx="34794" cy="0"/>
-            </a:xfrm>
-            <a:custGeom>
-              <a:avLst/>
-              <a:pathLst>
-                <a:path w="34794" h="0">
-                  <a:moveTo>
-                    <a:pt x="0" y="0"/>
-                  </a:moveTo>
-                  <a:lnTo>
-                    <a:pt x="34794" y="0"/>
-                  </a:lnTo>
-                </a:path>
-              </a:pathLst>
-            </a:custGeom>
-            <a:ln w="13550" cap="flat">
-              <a:solidFill>
-                <a:srgbClr val="333333">
-                  <a:alpha val="100000"/>
-                </a:srgbClr>
-              </a:solidFill>
-              <a:prstDash val="solid"/>
-              <a:round/>
-            </a:ln>
-          </p:spPr>
-          <p:txBody>
-            <a:bodyPr/>
-            <a:lstStyle/>
-            <a:p/>
-          </p:txBody>
-        </p:sp>
-        <p:sp>
-          <p:nvSpPr>
-            <p:cNvPr id="33" name="pl33"/>
-            <p:cNvSpPr/>
-            <p:nvPr/>
-          </p:nvSpPr>
-          <p:spPr>
-            <a:xfrm>
-              <a:off x="4305899" y="3245244"/>
-              <a:ext cx="34794" cy="0"/>
-            </a:xfrm>
-            <a:custGeom>
-              <a:avLst/>
-              <a:pathLst>
-                <a:path w="34794" h="0">
-                  <a:moveTo>
-                    <a:pt x="0" y="0"/>
-                  </a:moveTo>
-                  <a:lnTo>
-                    <a:pt x="34794" y="0"/>
-                  </a:lnTo>
-                </a:path>
-              </a:pathLst>
-            </a:custGeom>
-            <a:ln w="13550" cap="flat">
-              <a:solidFill>
-                <a:srgbClr val="333333">
-                  <a:alpha val="100000"/>
-                </a:srgbClr>
-              </a:solidFill>
-              <a:prstDash val="solid"/>
-              <a:round/>
-            </a:ln>
-          </p:spPr>
-          <p:txBody>
-            <a:bodyPr/>
-            <a:lstStyle/>
-            <a:p/>
+            <a:p>
+              <a:pPr algn="l" marL="0" marR="0" indent="0">
+                <a:lnSpc>
+                  <a:spcPts val="880"/>
+                </a:lnSpc>
+                <a:spcBef>
+                  <a:spcPts val="0"/>
+                </a:spcBef>
+                <a:spcAft>
+                  <a:spcPts val="0"/>
+                </a:spcAft>
+              </a:pPr>
+              <a:r>
+                <a:rPr sz="880">
+                  <a:solidFill>
+                    <a:srgbClr val="4D4D4D">
+                      <a:alpha val="100000"/>
+                    </a:srgbClr>
+                  </a:solidFill>
+                  <a:latin typeface="Arial"/>
+                  <a:cs typeface="Arial"/>
+                </a:rPr>
+                <a:t>2.0</a:t>
+              </a:r>
+            </a:p>
           </p:txBody>
         </p:sp>
         <p:sp>
@@ -4300,18 +5143,18 @@
           </p:nvSpPr>
           <p:spPr>
             <a:xfrm>
-              <a:off x="4359404" y="8600749"/>
-              <a:ext cx="0" cy="34794"/>
+              <a:off x="4340693" y="8572436"/>
+              <a:ext cx="34794" cy="0"/>
             </a:xfrm>
             <a:custGeom>
               <a:avLst/>
               <a:pathLst>
-                <a:path w="0" h="34794">
+                <a:path w="34794" h="0">
                   <a:moveTo>
-                    <a:pt x="0" y="34794"/>
+                    <a:pt x="0" y="0"/>
                   </a:moveTo>
                   <a:lnTo>
-                    <a:pt x="0" y="0"/>
+                    <a:pt x="34794" y="0"/>
                   </a:lnTo>
                 </a:path>
               </a:pathLst>
@@ -4340,18 +5183,18 @@
           </p:nvSpPr>
           <p:spPr>
             <a:xfrm>
-              <a:off x="6085456" y="8600749"/>
-              <a:ext cx="0" cy="34794"/>
+              <a:off x="4340693" y="7182495"/>
+              <a:ext cx="34794" cy="0"/>
             </a:xfrm>
             <a:custGeom>
               <a:avLst/>
               <a:pathLst>
-                <a:path w="0" h="34794">
+                <a:path w="34794" h="0">
                   <a:moveTo>
-                    <a:pt x="0" y="34794"/>
+                    <a:pt x="0" y="0"/>
                   </a:moveTo>
                   <a:lnTo>
-                    <a:pt x="0" y="0"/>
+                    <a:pt x="34794" y="0"/>
                   </a:lnTo>
                 </a:path>
               </a:pathLst>
@@ -4380,18 +5223,18 @@
           </p:nvSpPr>
           <p:spPr>
             <a:xfrm>
-              <a:off x="7811508" y="8600749"/>
-              <a:ext cx="0" cy="34794"/>
+              <a:off x="4340693" y="5792554"/>
+              <a:ext cx="34794" cy="0"/>
             </a:xfrm>
             <a:custGeom>
               <a:avLst/>
               <a:pathLst>
-                <a:path w="0" h="34794">
+                <a:path w="34794" h="0">
                   <a:moveTo>
-                    <a:pt x="0" y="34794"/>
+                    <a:pt x="0" y="0"/>
                   </a:moveTo>
                   <a:lnTo>
-                    <a:pt x="0" y="0"/>
+                    <a:pt x="34794" y="0"/>
                   </a:lnTo>
                 </a:path>
               </a:pathLst>
@@ -4420,18 +5263,18 @@
           </p:nvSpPr>
           <p:spPr>
             <a:xfrm>
-              <a:off x="9537560" y="8600749"/>
-              <a:ext cx="0" cy="34794"/>
+              <a:off x="4340693" y="4402613"/>
+              <a:ext cx="34794" cy="0"/>
             </a:xfrm>
             <a:custGeom>
               <a:avLst/>
               <a:pathLst>
-                <a:path w="0" h="34794">
+                <a:path w="34794" h="0">
                   <a:moveTo>
-                    <a:pt x="0" y="34794"/>
+                    <a:pt x="0" y="0"/>
                   </a:moveTo>
                   <a:lnTo>
-                    <a:pt x="0" y="0"/>
+                    <a:pt x="34794" y="0"/>
                   </a:lnTo>
                 </a:path>
               </a:pathLst>
@@ -4454,13 +5297,213 @@
         </p:sp>
         <p:sp>
           <p:nvSpPr>
-            <p:cNvPr id="38" name="tx38"/>
+            <p:cNvPr id="38" name="pl38"/>
             <p:cNvSpPr/>
             <p:nvPr/>
           </p:nvSpPr>
           <p:spPr>
             <a:xfrm>
-              <a:off x="4327620" y="8661593"/>
+              <a:off x="4340693" y="3012672"/>
+              <a:ext cx="34794" cy="0"/>
+            </a:xfrm>
+            <a:custGeom>
+              <a:avLst/>
+              <a:pathLst>
+                <a:path w="34794" h="0">
+                  <a:moveTo>
+                    <a:pt x="0" y="0"/>
+                  </a:moveTo>
+                  <a:lnTo>
+                    <a:pt x="34794" y="0"/>
+                  </a:lnTo>
+                </a:path>
+              </a:pathLst>
+            </a:custGeom>
+            <a:ln w="13550" cap="flat">
+              <a:solidFill>
+                <a:srgbClr val="333333">
+                  <a:alpha val="100000"/>
+                </a:srgbClr>
+              </a:solidFill>
+              <a:prstDash val="solid"/>
+              <a:round/>
+            </a:ln>
+          </p:spPr>
+          <p:txBody>
+            <a:bodyPr/>
+            <a:lstStyle/>
+            <a:p/>
+          </p:txBody>
+        </p:sp>
+        <p:sp>
+          <p:nvSpPr>
+            <p:cNvPr id="39" name="pl39"/>
+            <p:cNvSpPr/>
+            <p:nvPr/>
+          </p:nvSpPr>
+          <p:spPr>
+            <a:xfrm>
+              <a:off x="4682593" y="8594529"/>
+              <a:ext cx="0" cy="34794"/>
+            </a:xfrm>
+            <a:custGeom>
+              <a:avLst/>
+              <a:pathLst>
+                <a:path w="0" h="34794">
+                  <a:moveTo>
+                    <a:pt x="0" y="34794"/>
+                  </a:moveTo>
+                  <a:lnTo>
+                    <a:pt x="0" y="0"/>
+                  </a:lnTo>
+                </a:path>
+              </a:pathLst>
+            </a:custGeom>
+            <a:ln w="13550" cap="flat">
+              <a:solidFill>
+                <a:srgbClr val="333333">
+                  <a:alpha val="100000"/>
+                </a:srgbClr>
+              </a:solidFill>
+              <a:prstDash val="solid"/>
+              <a:round/>
+            </a:ln>
+          </p:spPr>
+          <p:txBody>
+            <a:bodyPr/>
+            <a:lstStyle/>
+            <a:p/>
+          </p:txBody>
+        </p:sp>
+        <p:sp>
+          <p:nvSpPr>
+            <p:cNvPr id="40" name="pl40"/>
+            <p:cNvSpPr/>
+            <p:nvPr/>
+          </p:nvSpPr>
+          <p:spPr>
+            <a:xfrm>
+              <a:off x="6322239" y="8594529"/>
+              <a:ext cx="0" cy="34794"/>
+            </a:xfrm>
+            <a:custGeom>
+              <a:avLst/>
+              <a:pathLst>
+                <a:path w="0" h="34794">
+                  <a:moveTo>
+                    <a:pt x="0" y="34794"/>
+                  </a:moveTo>
+                  <a:lnTo>
+                    <a:pt x="0" y="0"/>
+                  </a:lnTo>
+                </a:path>
+              </a:pathLst>
+            </a:custGeom>
+            <a:ln w="13550" cap="flat">
+              <a:solidFill>
+                <a:srgbClr val="333333">
+                  <a:alpha val="100000"/>
+                </a:srgbClr>
+              </a:solidFill>
+              <a:prstDash val="solid"/>
+              <a:round/>
+            </a:ln>
+          </p:spPr>
+          <p:txBody>
+            <a:bodyPr/>
+            <a:lstStyle/>
+            <a:p/>
+          </p:txBody>
+        </p:sp>
+        <p:sp>
+          <p:nvSpPr>
+            <p:cNvPr id="41" name="pl41"/>
+            <p:cNvSpPr/>
+            <p:nvPr/>
+          </p:nvSpPr>
+          <p:spPr>
+            <a:xfrm>
+              <a:off x="7961884" y="8594529"/>
+              <a:ext cx="0" cy="34794"/>
+            </a:xfrm>
+            <a:custGeom>
+              <a:avLst/>
+              <a:pathLst>
+                <a:path w="0" h="34794">
+                  <a:moveTo>
+                    <a:pt x="0" y="34794"/>
+                  </a:moveTo>
+                  <a:lnTo>
+                    <a:pt x="0" y="0"/>
+                  </a:lnTo>
+                </a:path>
+              </a:pathLst>
+            </a:custGeom>
+            <a:ln w="13550" cap="flat">
+              <a:solidFill>
+                <a:srgbClr val="333333">
+                  <a:alpha val="100000"/>
+                </a:srgbClr>
+              </a:solidFill>
+              <a:prstDash val="solid"/>
+              <a:round/>
+            </a:ln>
+          </p:spPr>
+          <p:txBody>
+            <a:bodyPr/>
+            <a:lstStyle/>
+            <a:p/>
+          </p:txBody>
+        </p:sp>
+        <p:sp>
+          <p:nvSpPr>
+            <p:cNvPr id="42" name="pl42"/>
+            <p:cNvSpPr/>
+            <p:nvPr/>
+          </p:nvSpPr>
+          <p:spPr>
+            <a:xfrm>
+              <a:off x="9601529" y="8594529"/>
+              <a:ext cx="0" cy="34794"/>
+            </a:xfrm>
+            <a:custGeom>
+              <a:avLst/>
+              <a:pathLst>
+                <a:path w="0" h="34794">
+                  <a:moveTo>
+                    <a:pt x="0" y="34794"/>
+                  </a:moveTo>
+                  <a:lnTo>
+                    <a:pt x="0" y="0"/>
+                  </a:lnTo>
+                </a:path>
+              </a:pathLst>
+            </a:custGeom>
+            <a:ln w="13550" cap="flat">
+              <a:solidFill>
+                <a:srgbClr val="333333">
+                  <a:alpha val="100000"/>
+                </a:srgbClr>
+              </a:solidFill>
+              <a:prstDash val="solid"/>
+              <a:round/>
+            </a:ln>
+          </p:spPr>
+          <p:txBody>
+            <a:bodyPr/>
+            <a:lstStyle/>
+            <a:p/>
+          </p:txBody>
+        </p:sp>
+        <p:sp>
+          <p:nvSpPr>
+            <p:cNvPr id="43" name="tx43"/>
+            <p:cNvSpPr/>
+            <p:nvPr/>
+          </p:nvSpPr>
+          <p:spPr>
+            <a:xfrm>
+              <a:off x="4650809" y="8655373"/>
               <a:ext cx="63568" cy="83542"/>
             </a:xfrm>
             <a:prstGeom prst="rect">
@@ -4500,13 +5543,13 @@
         </p:sp>
         <p:sp>
           <p:nvSpPr>
-            <p:cNvPr id="39" name="tx39"/>
+            <p:cNvPr id="44" name="tx44"/>
             <p:cNvSpPr/>
             <p:nvPr/>
           </p:nvSpPr>
           <p:spPr>
             <a:xfrm>
-              <a:off x="5990103" y="8661593"/>
+              <a:off x="6226886" y="8655373"/>
               <a:ext cx="190704" cy="83542"/>
             </a:xfrm>
             <a:prstGeom prst="rect">
@@ -4546,13 +5589,13 @@
         </p:sp>
         <p:sp>
           <p:nvSpPr>
-            <p:cNvPr id="40" name="tx40"/>
+            <p:cNvPr id="45" name="tx45"/>
             <p:cNvSpPr/>
             <p:nvPr/>
           </p:nvSpPr>
           <p:spPr>
             <a:xfrm>
-              <a:off x="7684371" y="8661593"/>
+              <a:off x="7834748" y="8655373"/>
               <a:ext cx="254272" cy="83542"/>
             </a:xfrm>
             <a:prstGeom prst="rect">
@@ -4592,13 +5635,13 @@
         </p:sp>
         <p:sp>
           <p:nvSpPr>
-            <p:cNvPr id="41" name="tx41"/>
+            <p:cNvPr id="46" name="tx46"/>
             <p:cNvSpPr/>
             <p:nvPr/>
           </p:nvSpPr>
           <p:spPr>
             <a:xfrm>
-              <a:off x="9410423" y="8661593"/>
+              <a:off x="9474393" y="8655373"/>
               <a:ext cx="254272" cy="83542"/>
             </a:xfrm>
             <a:prstGeom prst="rect">
@@ -4638,14 +5681,14 @@
         </p:sp>
         <p:sp>
           <p:nvSpPr>
-            <p:cNvPr id="42" name="tx42"/>
+            <p:cNvPr id="47" name="tx47"/>
             <p:cNvSpPr/>
             <p:nvPr/>
           </p:nvSpPr>
           <p:spPr>
             <a:xfrm>
-              <a:off x="6936558" y="8779136"/>
-              <a:ext cx="1599387" cy="129381"/>
+              <a:off x="6488266" y="8777350"/>
+              <a:ext cx="2530766" cy="131167"/>
             </a:xfrm>
             <a:prstGeom prst="rect">
               <a:avLst/>
@@ -4677,21 +5720,21 @@
                   <a:latin typeface="Arial"/>
                   <a:cs typeface="Arial"/>
                 </a:rPr>
-                <a:t>Foreign Direct Investment</a:t>
+                <a:t>Direct Foreign Investment (USD Millions)</a:t>
               </a:r>
             </a:p>
           </p:txBody>
         </p:sp>
         <p:sp>
           <p:nvSpPr>
-            <p:cNvPr id="43" name="tx43"/>
+            <p:cNvPr id="48" name="tx48"/>
             <p:cNvSpPr/>
             <p:nvPr/>
           </p:nvSpPr>
           <p:spPr>
             <a:xfrm rot="-5400000">
-              <a:off x="3271970" y="5115326"/>
-              <a:ext cx="1436495" cy="131167"/>
+              <a:off x="3109043" y="5112216"/>
+              <a:ext cx="1762348" cy="131167"/>
             </a:xfrm>
             <a:prstGeom prst="rect">
               <a:avLst/>
@@ -4723,7 +5766,7 @@
                   <a:latin typeface="Arial"/>
                   <a:cs typeface="Arial"/>
                 </a:rPr>
-                <a:t>Forest cover % change</a:t>
+                <a:t>Rate of forest cover loss (%)</a:t>
               </a:r>
             </a:p>
           </p:txBody>

</xml_diff>